<commit_message>
Docs (presentation) : added a little correction
</commit_message>
<xml_diff>
--- a/machineLearningPresentation.pptx
+++ b/machineLearningPresentation.pptx
@@ -3415,7 +3415,7 @@
         </p:blipFill>
         <p:spPr>
           <a:xfrm>
-            <a:off x="1758950" y="3268285"/>
+            <a:off x="1758950" y="2785685"/>
             <a:ext cx="8674100" cy="1841500"/>
           </a:xfrm>
           <a:prstGeom prst="rect">
@@ -3423,6 +3423,97 @@
           </a:prstGeom>
         </p:spPr>
       </p:pic>
+      <p:sp>
+        <p:nvSpPr>
+          <p:cNvPr id="3" name="TextBox 2">
+            <a:extLst>
+              <a:ext uri="{FF2B5EF4-FFF2-40B4-BE49-F238E27FC236}">
+                <a16:creationId xmlns:a16="http://schemas.microsoft.com/office/drawing/2014/main" id="{E8ABD999-5559-F64B-BA11-F0DBF5BB79EC}"/>
+              </a:ext>
+            </a:extLst>
+          </p:cNvPr>
+          <p:cNvSpPr txBox="1"/>
+          <p:nvPr/>
+        </p:nvSpPr>
+        <p:spPr>
+          <a:xfrm>
+            <a:off x="1758950" y="5207000"/>
+            <a:ext cx="8674100" cy="369332"/>
+          </a:xfrm>
+          <a:prstGeom prst="rect">
+            <a:avLst/>
+          </a:prstGeom>
+          <a:noFill/>
+        </p:spPr>
+        <p:txBody>
+          <a:bodyPr wrap="square" rtlCol="0">
+            <a:spAutoFit/>
+          </a:bodyPr>
+          <a:lstStyle/>
+          <a:p>
+            <a:pPr algn="ctr"/>
+            <a:r>
+              <a:rPr lang="fr-FR" dirty="0" err="1"/>
+              <a:t>With</a:t>
+            </a:r>
+            <a:r>
+              <a:rPr lang="fr-FR" dirty="0"/>
+              <a:t> a simple euclidien distance : (0.45614035087719296, 0.38461538461538464)</a:t>
+            </a:r>
+          </a:p>
+        </p:txBody>
+      </p:sp>
+      <p:sp>
+        <p:nvSpPr>
+          <p:cNvPr id="5" name="TextBox 4">
+            <a:extLst>
+              <a:ext uri="{FF2B5EF4-FFF2-40B4-BE49-F238E27FC236}">
+                <a16:creationId xmlns:a16="http://schemas.microsoft.com/office/drawing/2014/main" id="{29F3B67B-99A8-1C4A-A036-790115D7D4EE}"/>
+              </a:ext>
+            </a:extLst>
+          </p:cNvPr>
+          <p:cNvSpPr txBox="1"/>
+          <p:nvPr/>
+        </p:nvSpPr>
+        <p:spPr>
+          <a:xfrm>
+            <a:off x="4047843" y="5576332"/>
+            <a:ext cx="4096314" cy="369332"/>
+          </a:xfrm>
+          <a:prstGeom prst="rect">
+            <a:avLst/>
+          </a:prstGeom>
+          <a:noFill/>
+        </p:spPr>
+        <p:txBody>
+          <a:bodyPr wrap="none" rtlCol="0">
+            <a:spAutoFit/>
+          </a:bodyPr>
+          <a:lstStyle/>
+          <a:p>
+            <a:r>
+              <a:rPr lang="fr-FR" dirty="0"/>
+              <a:t>Best K </a:t>
+            </a:r>
+            <a:r>
+              <a:rPr lang="fr-FR" dirty="0" err="1"/>
+              <a:t>found</a:t>
+            </a:r>
+            <a:r>
+              <a:rPr lang="fr-FR" dirty="0"/>
+              <a:t> </a:t>
+            </a:r>
+            <a:r>
+              <a:rPr lang="fr-FR" dirty="0" err="1"/>
+              <a:t>with</a:t>
+            </a:r>
+            <a:r>
+              <a:rPr lang="fr-FR" dirty="0"/>
+              <a:t> a 1000 values set : 100</a:t>
+            </a:r>
+          </a:p>
+        </p:txBody>
+      </p:sp>
     </p:spTree>
     <p:extLst>
       <p:ext uri="{BB962C8B-B14F-4D97-AF65-F5344CB8AC3E}">

</xml_diff>